<commit_message>
Fix a typo in filter slide
</commit_message>
<xml_diff>
--- a/Lesson.07 - Functional Programming/Functional Programming.pptx
+++ b/Lesson.07 - Functional Programming/Functional Programming.pptx
@@ -256,7 +256,7 @@
           <a:p>
             <a:fld id="{14042657-6240-B14B-9F48-F865CB79AC7C}" type="datetimeFigureOut">
               <a:rPr lang="en-US" smtClean="0"/>
-              <a:t>11/23/25</a:t>
+              <a:t>11/24/25</a:t>
             </a:fld>
             <a:endParaRPr lang="en-US"/>
           </a:p>
@@ -440,7 +440,7 @@
           <a:p>
             <a:fld id="{5E6B121A-761B-2742-9D61-65348EACD743}" type="datetimeFigureOut">
               <a:rPr lang="en-US" smtClean="0"/>
-              <a:t>11/23/25</a:t>
+              <a:t>11/24/25</a:t>
             </a:fld>
             <a:endParaRPr lang="en-US"/>
           </a:p>
@@ -1404,7 +1404,7 @@
           <a:lstStyle/>
           <a:p>
             <a:fld id="{CEB9500E-B1E3-7944-A623-0BC5B2051451}" type="datetime1">
-              <a:t>11/23/25</a:t>
+              <a:t>11/24/25</a:t>
             </a:fld>
             <a:endParaRPr lang="en-US"/>
           </a:p>
@@ -1604,7 +1604,7 @@
           <a:lstStyle/>
           <a:p>
             <a:fld id="{96FD0179-B5BE-DD4B-AF31-3577D594C674}" type="datetime1">
-              <a:t>11/23/25</a:t>
+              <a:t>11/24/25</a:t>
             </a:fld>
             <a:endParaRPr lang="en-US"/>
           </a:p>
@@ -1814,7 +1814,7 @@
           <a:lstStyle/>
           <a:p>
             <a:fld id="{4C688B05-DCA8-9244-9A1E-C94DAD8650C6}" type="datetime1">
-              <a:t>11/23/25</a:t>
+              <a:t>11/24/25</a:t>
             </a:fld>
             <a:endParaRPr lang="en-US"/>
           </a:p>
@@ -2014,7 +2014,7 @@
           <a:lstStyle/>
           <a:p>
             <a:fld id="{FA7FD439-043B-9646-903C-5D26A8F5DDF3}" type="datetime1">
-              <a:t>11/23/25</a:t>
+              <a:t>11/24/25</a:t>
             </a:fld>
             <a:endParaRPr lang="en-US"/>
           </a:p>
@@ -2291,7 +2291,7 @@
           <a:lstStyle/>
           <a:p>
             <a:fld id="{31466A9C-D282-FB41-B45E-A913E819D30A}" type="datetime1">
-              <a:t>11/23/25</a:t>
+              <a:t>11/24/25</a:t>
             </a:fld>
             <a:endParaRPr lang="en-US"/>
           </a:p>
@@ -2558,7 +2558,7 @@
           <a:lstStyle/>
           <a:p>
             <a:fld id="{525D0A84-A933-1948-B4BF-E9164DAEF53F}" type="datetime1">
-              <a:t>11/23/25</a:t>
+              <a:t>11/24/25</a:t>
             </a:fld>
             <a:endParaRPr lang="en-US"/>
           </a:p>
@@ -2972,7 +2972,7 @@
           <a:lstStyle/>
           <a:p>
             <a:fld id="{7CC55DA2-34EB-4C47-9CFF-0285DA3582C4}" type="datetime1">
-              <a:t>11/23/25</a:t>
+              <a:t>11/24/25</a:t>
             </a:fld>
             <a:endParaRPr lang="en-US"/>
           </a:p>
@@ -3115,7 +3115,7 @@
           <a:lstStyle/>
           <a:p>
             <a:fld id="{7CAB8E56-0D8A-EC4F-9E46-96012B948B66}" type="datetime1">
-              <a:t>11/23/25</a:t>
+              <a:t>11/24/25</a:t>
             </a:fld>
             <a:endParaRPr lang="en-US"/>
           </a:p>
@@ -3230,7 +3230,7 @@
           <a:lstStyle/>
           <a:p>
             <a:fld id="{F1287D89-07E6-9442-9D3D-73ECDABC9DFD}" type="datetime1">
-              <a:t>11/23/25</a:t>
+              <a:t>11/24/25</a:t>
             </a:fld>
             <a:endParaRPr lang="en-US"/>
           </a:p>
@@ -3543,7 +3543,7 @@
           <a:lstStyle/>
           <a:p>
             <a:fld id="{2D1223F8-42EB-7C44-A39D-C4E4D7BD17BC}" type="datetime1">
-              <a:t>11/23/25</a:t>
+              <a:t>11/24/25</a:t>
             </a:fld>
             <a:endParaRPr lang="en-US"/>
           </a:p>
@@ -3833,7 +3833,7 @@
           <a:lstStyle/>
           <a:p>
             <a:fld id="{8A0A78F3-6C49-9949-BEC9-7321A445B87F}" type="datetime1">
-              <a:t>11/23/25</a:t>
+              <a:t>11/24/25</a:t>
             </a:fld>
             <a:endParaRPr lang="en-US"/>
           </a:p>
@@ -4076,7 +4076,7 @@
           </a:lstStyle>
           <a:p>
             <a:fld id="{2A87C20C-68E6-CA4F-A5A8-3810CF5C5075}" type="datetime1">
-              <a:t>11/23/25</a:t>
+              <a:t>11/24/25</a:t>
             </a:fld>
             <a:endParaRPr lang="en-US"/>
           </a:p>
@@ -5579,7 +5579,7 @@
                 <a:latin typeface="Courier New" panose="02070309020205020404" pitchFamily="49" charset="0"/>
                 <a:cs typeface="Courier New" panose="02070309020205020404" pitchFamily="49" charset="0"/>
               </a:rPr>
-              <a:t>const target: string[] = [1, 2, 3, 4, 5].filter(item =&gt; item % 2 === 0); // [2, 4]</a:t>
+              <a:t>const target: number[] = [1, 2, 3, 4, 5].filter(item =&gt; item % 2 === 0); // [2, 4]</a:t>
             </a:r>
           </a:p>
         </p:txBody>
@@ -5889,7 +5889,7 @@
                 <a:latin typeface="Courier New" panose="02070309020205020404" pitchFamily="49" charset="0"/>
                 <a:cs typeface="Courier New" panose="02070309020205020404" pitchFamily="49" charset="0"/>
               </a:rPr>
-              <a:t>       out.add(item);</a:t>
+              <a:t>       out.add(item); // clone!!!</a:t>
             </a:r>
           </a:p>
           <a:p>

</xml_diff>

<commit_message>
Fix some typos in Monads
</commit_message>
<xml_diff>
--- a/Lesson.07 - Functional Programming/Functional Programming.pptx
+++ b/Lesson.07 - Functional Programming/Functional Programming.pptx
@@ -256,7 +256,7 @@
           <a:p>
             <a:fld id="{14042657-6240-B14B-9F48-F865CB79AC7C}" type="datetimeFigureOut">
               <a:rPr lang="en-US" smtClean="0"/>
-              <a:t>11/24/25</a:t>
+              <a:t>11/26/25</a:t>
             </a:fld>
             <a:endParaRPr lang="en-US"/>
           </a:p>
@@ -440,7 +440,7 @@
           <a:p>
             <a:fld id="{5E6B121A-761B-2742-9D61-65348EACD743}" type="datetimeFigureOut">
               <a:rPr lang="en-US" smtClean="0"/>
-              <a:t>11/24/25</a:t>
+              <a:t>11/26/25</a:t>
             </a:fld>
             <a:endParaRPr lang="en-US"/>
           </a:p>
@@ -1404,7 +1404,7 @@
           <a:lstStyle/>
           <a:p>
             <a:fld id="{CEB9500E-B1E3-7944-A623-0BC5B2051451}" type="datetime1">
-              <a:t>11/24/25</a:t>
+              <a:t>11/26/25</a:t>
             </a:fld>
             <a:endParaRPr lang="en-US"/>
           </a:p>
@@ -1604,7 +1604,7 @@
           <a:lstStyle/>
           <a:p>
             <a:fld id="{96FD0179-B5BE-DD4B-AF31-3577D594C674}" type="datetime1">
-              <a:t>11/24/25</a:t>
+              <a:t>11/26/25</a:t>
             </a:fld>
             <a:endParaRPr lang="en-US"/>
           </a:p>
@@ -1814,7 +1814,7 @@
           <a:lstStyle/>
           <a:p>
             <a:fld id="{4C688B05-DCA8-9244-9A1E-C94DAD8650C6}" type="datetime1">
-              <a:t>11/24/25</a:t>
+              <a:t>11/26/25</a:t>
             </a:fld>
             <a:endParaRPr lang="en-US"/>
           </a:p>
@@ -2014,7 +2014,7 @@
           <a:lstStyle/>
           <a:p>
             <a:fld id="{FA7FD439-043B-9646-903C-5D26A8F5DDF3}" type="datetime1">
-              <a:t>11/24/25</a:t>
+              <a:t>11/26/25</a:t>
             </a:fld>
             <a:endParaRPr lang="en-US"/>
           </a:p>
@@ -2291,7 +2291,7 @@
           <a:lstStyle/>
           <a:p>
             <a:fld id="{31466A9C-D282-FB41-B45E-A913E819D30A}" type="datetime1">
-              <a:t>11/24/25</a:t>
+              <a:t>11/26/25</a:t>
             </a:fld>
             <a:endParaRPr lang="en-US"/>
           </a:p>
@@ -2558,7 +2558,7 @@
           <a:lstStyle/>
           <a:p>
             <a:fld id="{525D0A84-A933-1948-B4BF-E9164DAEF53F}" type="datetime1">
-              <a:t>11/24/25</a:t>
+              <a:t>11/26/25</a:t>
             </a:fld>
             <a:endParaRPr lang="en-US"/>
           </a:p>
@@ -2972,7 +2972,7 @@
           <a:lstStyle/>
           <a:p>
             <a:fld id="{7CC55DA2-34EB-4C47-9CFF-0285DA3582C4}" type="datetime1">
-              <a:t>11/24/25</a:t>
+              <a:t>11/26/25</a:t>
             </a:fld>
             <a:endParaRPr lang="en-US"/>
           </a:p>
@@ -3115,7 +3115,7 @@
           <a:lstStyle/>
           <a:p>
             <a:fld id="{7CAB8E56-0D8A-EC4F-9E46-96012B948B66}" type="datetime1">
-              <a:t>11/24/25</a:t>
+              <a:t>11/26/25</a:t>
             </a:fld>
             <a:endParaRPr lang="en-US"/>
           </a:p>
@@ -3230,7 +3230,7 @@
           <a:lstStyle/>
           <a:p>
             <a:fld id="{F1287D89-07E6-9442-9D3D-73ECDABC9DFD}" type="datetime1">
-              <a:t>11/24/25</a:t>
+              <a:t>11/26/25</a:t>
             </a:fld>
             <a:endParaRPr lang="en-US"/>
           </a:p>
@@ -3543,7 +3543,7 @@
           <a:lstStyle/>
           <a:p>
             <a:fld id="{2D1223F8-42EB-7C44-A39D-C4E4D7BD17BC}" type="datetime1">
-              <a:t>11/24/25</a:t>
+              <a:t>11/26/25</a:t>
             </a:fld>
             <a:endParaRPr lang="en-US"/>
           </a:p>
@@ -3833,7 +3833,7 @@
           <a:lstStyle/>
           <a:p>
             <a:fld id="{8A0A78F3-6C49-9949-BEC9-7321A445B87F}" type="datetime1">
-              <a:t>11/24/25</a:t>
+              <a:t>11/26/25</a:t>
             </a:fld>
             <a:endParaRPr lang="en-US"/>
           </a:p>
@@ -4076,7 +4076,7 @@
           </a:lstStyle>
           <a:p>
             <a:fld id="{2A87C20C-68E6-CA4F-A5A8-3810CF5C5075}" type="datetime1">
-              <a:t>11/24/25</a:t>
+              <a:t>11/26/25</a:t>
             </a:fld>
             <a:endParaRPr lang="en-US"/>
           </a:p>
@@ -14313,322 +14313,6 @@
       </p:sp>
       <p:sp>
         <p:nvSpPr>
-          <p:cNvPr id="2" name="TextBox 1">
-            <a:extLst>
-              <a:ext uri="{FF2B5EF4-FFF2-40B4-BE49-F238E27FC236}">
-                <a16:creationId xmlns:a16="http://schemas.microsoft.com/office/drawing/2014/main" id="{BE817125-1F7F-4722-7020-878D39DE84E8}"/>
-              </a:ext>
-            </a:extLst>
-          </p:cNvPr>
-          <p:cNvSpPr txBox="1"/>
-          <p:nvPr/>
-        </p:nvSpPr>
-        <p:spPr>
-          <a:xfrm>
-            <a:off x="369455" y="1496328"/>
-            <a:ext cx="3839513" cy="4154984"/>
-          </a:xfrm>
-          <a:prstGeom prst="rect">
-            <a:avLst/>
-          </a:prstGeom>
-          <a:noFill/>
-        </p:spPr>
-        <p:txBody>
-          <a:bodyPr wrap="none" rtlCol="0">
-            <a:spAutoFit/>
-          </a:bodyPr>
-          <a:lstStyle/>
-          <a:p>
-            <a:r>
-              <a:rPr lang="en-US" sz="800">
-                <a:latin typeface="Courier New" panose="02070309020205020404" pitchFamily="49" charset="0"/>
-                <a:cs typeface="Courier New" panose="02070309020205020404" pitchFamily="49" charset="0"/>
-              </a:rPr>
-              <a:t>interface User {</a:t>
-            </a:r>
-          </a:p>
-          <a:p>
-            <a:r>
-              <a:rPr lang="en-US" sz="800">
-                <a:latin typeface="Courier New" panose="02070309020205020404" pitchFamily="49" charset="0"/>
-                <a:cs typeface="Courier New" panose="02070309020205020404" pitchFamily="49" charset="0"/>
-              </a:rPr>
-              <a:t>  name: string;</a:t>
-            </a:r>
-          </a:p>
-          <a:p>
-            <a:r>
-              <a:rPr lang="en-US" sz="800">
-                <a:latin typeface="Courier New" panose="02070309020205020404" pitchFamily="49" charset="0"/>
-                <a:cs typeface="Courier New" panose="02070309020205020404" pitchFamily="49" charset="0"/>
-              </a:rPr>
-              <a:t>  balance: number;</a:t>
-            </a:r>
-          </a:p>
-          <a:p>
-            <a:r>
-              <a:rPr lang="en-US" sz="800">
-                <a:latin typeface="Courier New" panose="02070309020205020404" pitchFamily="49" charset="0"/>
-                <a:cs typeface="Courier New" panose="02070309020205020404" pitchFamily="49" charset="0"/>
-              </a:rPr>
-              <a:t>}</a:t>
-            </a:r>
-            <a:br>
-              <a:rPr lang="en-US" sz="800">
-                <a:latin typeface="Courier New" panose="02070309020205020404" pitchFamily="49" charset="0"/>
-                <a:cs typeface="Courier New" panose="02070309020205020404" pitchFamily="49" charset="0"/>
-              </a:rPr>
-            </a:br>
-            <a:br>
-              <a:rPr lang="en-US" sz="800">
-                <a:latin typeface="Courier New" panose="02070309020205020404" pitchFamily="49" charset="0"/>
-                <a:cs typeface="Courier New" panose="02070309020205020404" pitchFamily="49" charset="0"/>
-              </a:rPr>
-            </a:br>
-            <a:r>
-              <a:rPr lang="en-US" sz="800">
-                <a:latin typeface="Courier New" panose="02070309020205020404" pitchFamily="49" charset="0"/>
-                <a:cs typeface="Courier New" panose="02070309020205020404" pitchFamily="49" charset="0"/>
-              </a:rPr>
-              <a:t>const users = new Map&lt;number, User&gt;([</a:t>
-            </a:r>
-          </a:p>
-          <a:p>
-            <a:r>
-              <a:rPr lang="en-US" sz="800">
-                <a:latin typeface="Courier New" panose="02070309020205020404" pitchFamily="49" charset="0"/>
-                <a:cs typeface="Courier New" panose="02070309020205020404" pitchFamily="49" charset="0"/>
-              </a:rPr>
-              <a:t>  [1, { name: "Alice", balance: 200 }],</a:t>
-            </a:r>
-          </a:p>
-          <a:p>
-            <a:r>
-              <a:rPr lang="en-US" sz="800">
-                <a:latin typeface="Courier New" panose="02070309020205020404" pitchFamily="49" charset="0"/>
-                <a:cs typeface="Courier New" panose="02070309020205020404" pitchFamily="49" charset="0"/>
-              </a:rPr>
-              <a:t>  [2, { name: "Bob", balance: -50 }]</a:t>
-            </a:r>
-          </a:p>
-          <a:p>
-            <a:r>
-              <a:rPr lang="en-US" sz="800">
-                <a:latin typeface="Courier New" panose="02070309020205020404" pitchFamily="49" charset="0"/>
-                <a:cs typeface="Courier New" panose="02070309020205020404" pitchFamily="49" charset="0"/>
-              </a:rPr>
-              <a:t>]);</a:t>
-            </a:r>
-            <a:br>
-              <a:rPr lang="en-US" sz="800">
-                <a:latin typeface="Courier New" panose="02070309020205020404" pitchFamily="49" charset="0"/>
-                <a:cs typeface="Courier New" panose="02070309020205020404" pitchFamily="49" charset="0"/>
-              </a:rPr>
-            </a:br>
-            <a:endParaRPr lang="en-US" sz="800">
-              <a:latin typeface="Courier New" panose="02070309020205020404" pitchFamily="49" charset="0"/>
-              <a:cs typeface="Courier New" panose="02070309020205020404" pitchFamily="49" charset="0"/>
-            </a:endParaRPr>
-          </a:p>
-          <a:p>
-            <a:r>
-              <a:rPr lang="en-US" sz="800">
-                <a:latin typeface="Courier New" panose="02070309020205020404" pitchFamily="49" charset="0"/>
-                <a:cs typeface="Courier New" panose="02070309020205020404" pitchFamily="49" charset="0"/>
-              </a:rPr>
-              <a:t>function findUser(userId: number): User | null {</a:t>
-            </a:r>
-          </a:p>
-          <a:p>
-            <a:r>
-              <a:rPr lang="en-US" sz="800">
-                <a:latin typeface="Courier New" panose="02070309020205020404" pitchFamily="49" charset="0"/>
-                <a:cs typeface="Courier New" panose="02070309020205020404" pitchFamily="49" charset="0"/>
-              </a:rPr>
-              <a:t>  return users.get(userId, null);</a:t>
-            </a:r>
-          </a:p>
-          <a:p>
-            <a:r>
-              <a:rPr lang="en-US" sz="800">
-                <a:latin typeface="Courier New" panose="02070309020205020404" pitchFamily="49" charset="0"/>
-                <a:cs typeface="Courier New" panose="02070309020205020404" pitchFamily="49" charset="0"/>
-              </a:rPr>
-              <a:t>}</a:t>
-            </a:r>
-          </a:p>
-          <a:p>
-            <a:br>
-              <a:rPr lang="en-US" sz="800">
-                <a:latin typeface="Courier New" panose="02070309020205020404" pitchFamily="49" charset="0"/>
-                <a:cs typeface="Courier New" panose="02070309020205020404" pitchFamily="49" charset="0"/>
-              </a:rPr>
-            </a:br>
-            <a:r>
-              <a:rPr lang="en-US" sz="800">
-                <a:latin typeface="Courier New" panose="02070309020205020404" pitchFamily="49" charset="0"/>
-                <a:cs typeface="Courier New" panose="02070309020205020404" pitchFamily="49" charset="0"/>
-              </a:rPr>
-              <a:t>function getUserBalance(user: User): number | null {</a:t>
-            </a:r>
-          </a:p>
-          <a:p>
-            <a:r>
-              <a:rPr lang="en-US" sz="800">
-                <a:latin typeface="Courier New" panose="02070309020205020404" pitchFamily="49" charset="0"/>
-                <a:cs typeface="Courier New" panose="02070309020205020404" pitchFamily="49" charset="0"/>
-              </a:rPr>
-              <a:t>  return user.balance &gt;= 0 ? user.balance : null;</a:t>
-            </a:r>
-          </a:p>
-          <a:p>
-            <a:r>
-              <a:rPr lang="en-US" sz="800">
-                <a:latin typeface="Courier New" panose="02070309020205020404" pitchFamily="49" charset="0"/>
-                <a:cs typeface="Courier New" panose="02070309020205020404" pitchFamily="49" charset="0"/>
-              </a:rPr>
-              <a:t>}</a:t>
-            </a:r>
-          </a:p>
-          <a:p>
-            <a:endParaRPr lang="en-US" sz="800">
-              <a:latin typeface="Courier New" panose="02070309020205020404" pitchFamily="49" charset="0"/>
-              <a:cs typeface="Courier New" panose="02070309020205020404" pitchFamily="49" charset="0"/>
-            </a:endParaRPr>
-          </a:p>
-          <a:p>
-            <a:r>
-              <a:rPr lang="en-US" sz="800">
-                <a:latin typeface="Courier New" panose="02070309020205020404" pitchFamily="49" charset="0"/>
-                <a:cs typeface="Courier New" panose="02070309020205020404" pitchFamily="49" charset="0"/>
-              </a:rPr>
-              <a:t>function applyBonus(balance: number | null): number | null {</a:t>
-            </a:r>
-          </a:p>
-          <a:p>
-            <a:r>
-              <a:rPr lang="en-US" sz="800">
-                <a:latin typeface="Courier New" panose="02070309020205020404" pitchFamily="49" charset="0"/>
-                <a:cs typeface="Courier New" panose="02070309020205020404" pitchFamily="49" charset="0"/>
-              </a:rPr>
-              <a:t>  if (balance !== null) return balance * 1.10;</a:t>
-            </a:r>
-          </a:p>
-          <a:p>
-            <a:r>
-              <a:rPr lang="en-US" sz="800">
-                <a:latin typeface="Courier New" panose="02070309020205020404" pitchFamily="49" charset="0"/>
-                <a:cs typeface="Courier New" panose="02070309020205020404" pitchFamily="49" charset="0"/>
-              </a:rPr>
-              <a:t>  return null;</a:t>
-            </a:r>
-          </a:p>
-          <a:p>
-            <a:r>
-              <a:rPr lang="en-US" sz="800">
-                <a:latin typeface="Courier New" panose="02070309020205020404" pitchFamily="49" charset="0"/>
-                <a:cs typeface="Courier New" panose="02070309020205020404" pitchFamily="49" charset="0"/>
-              </a:rPr>
-              <a:t>}</a:t>
-            </a:r>
-          </a:p>
-          <a:p>
-            <a:endParaRPr lang="en-US" sz="800">
-              <a:latin typeface="Courier New" panose="02070309020205020404" pitchFamily="49" charset="0"/>
-              <a:cs typeface="Courier New" panose="02070309020205020404" pitchFamily="49" charset="0"/>
-            </a:endParaRPr>
-          </a:p>
-          <a:p>
-            <a:r>
-              <a:rPr lang="en-US" sz="800">
-                <a:latin typeface="Courier New" panose="02070309020205020404" pitchFamily="49" charset="0"/>
-                <a:cs typeface="Courier New" panose="02070309020205020404" pitchFamily="49" charset="0"/>
-              </a:rPr>
-              <a:t>const userId = 1;</a:t>
-            </a:r>
-          </a:p>
-          <a:p>
-            <a:r>
-              <a:rPr lang="en-US" sz="800">
-                <a:latin typeface="Courier New" panose="02070309020205020404" pitchFamily="49" charset="0"/>
-                <a:cs typeface="Courier New" panose="02070309020205020404" pitchFamily="49" charset="0"/>
-              </a:rPr>
-              <a:t>const user = findUser(userId);</a:t>
-            </a:r>
-          </a:p>
-          <a:p>
-            <a:r>
-              <a:rPr lang="en-US" sz="800">
-                <a:latin typeface="Courier New" panose="02070309020205020404" pitchFamily="49" charset="0"/>
-                <a:cs typeface="Courier New" panose="02070309020205020404" pitchFamily="49" charset="0"/>
-              </a:rPr>
-              <a:t>const balance = getUserBalance(userId);</a:t>
-            </a:r>
-          </a:p>
-          <a:p>
-            <a:r>
-              <a:rPr lang="en-US" sz="800">
-                <a:latin typeface="Courier New" panose="02070309020205020404" pitchFamily="49" charset="0"/>
-                <a:cs typeface="Courier New" panose="02070309020205020404" pitchFamily="49" charset="0"/>
-              </a:rPr>
-              <a:t>const newBalance = applyBonus(balance);</a:t>
-            </a:r>
-          </a:p>
-          <a:p>
-            <a:endParaRPr lang="en-US" sz="800">
-              <a:latin typeface="Courier New" panose="02070309020205020404" pitchFamily="49" charset="0"/>
-              <a:cs typeface="Courier New" panose="02070309020205020404" pitchFamily="49" charset="0"/>
-            </a:endParaRPr>
-          </a:p>
-          <a:p>
-            <a:r>
-              <a:rPr lang="en-US" sz="800">
-                <a:latin typeface="Courier New" panose="02070309020205020404" pitchFamily="49" charset="0"/>
-                <a:cs typeface="Courier New" panose="02070309020205020404" pitchFamily="49" charset="0"/>
-              </a:rPr>
-              <a:t>if (newBalance !== null) {</a:t>
-            </a:r>
-          </a:p>
-          <a:p>
-            <a:r>
-              <a:rPr lang="en-US" sz="800">
-                <a:latin typeface="Courier New" panose="02070309020205020404" pitchFamily="49" charset="0"/>
-                <a:cs typeface="Courier New" panose="02070309020205020404" pitchFamily="49" charset="0"/>
-              </a:rPr>
-              <a:t>  console.log(`New Balance: $${newBalance}`);</a:t>
-            </a:r>
-          </a:p>
-          <a:p>
-            <a:r>
-              <a:rPr lang="en-US" sz="800">
-                <a:latin typeface="Courier New" panose="02070309020205020404" pitchFamily="49" charset="0"/>
-                <a:cs typeface="Courier New" panose="02070309020205020404" pitchFamily="49" charset="0"/>
-              </a:rPr>
-              <a:t>} else {</a:t>
-            </a:r>
-          </a:p>
-          <a:p>
-            <a:r>
-              <a:rPr lang="en-US" sz="800">
-                <a:latin typeface="Courier New" panose="02070309020205020404" pitchFamily="49" charset="0"/>
-                <a:cs typeface="Courier New" panose="02070309020205020404" pitchFamily="49" charset="0"/>
-              </a:rPr>
-              <a:t>  console.log("Operation failed");</a:t>
-            </a:r>
-          </a:p>
-          <a:p>
-            <a:r>
-              <a:rPr lang="en-US" sz="800">
-                <a:latin typeface="Courier New" panose="02070309020205020404" pitchFamily="49" charset="0"/>
-                <a:cs typeface="Courier New" panose="02070309020205020404" pitchFamily="49" charset="0"/>
-              </a:rPr>
-              <a:t>}</a:t>
-            </a:r>
-          </a:p>
-        </p:txBody>
-      </p:sp>
-      <p:sp>
-        <p:nvSpPr>
           <p:cNvPr id="9" name="TextBox 8">
             <a:extLst>
               <a:ext uri="{FF2B5EF4-FFF2-40B4-BE49-F238E27FC236}">
@@ -14641,7 +14325,7 @@
         </p:nvSpPr>
         <p:spPr>
           <a:xfrm>
-            <a:off x="5960212" y="194055"/>
+            <a:off x="735069" y="2161874"/>
             <a:ext cx="2560316" cy="3416320"/>
           </a:xfrm>
           <a:prstGeom prst="rect">
@@ -14901,8 +14585,8 @@
         </p:nvSpPr>
         <p:spPr>
           <a:xfrm>
-            <a:off x="8730490" y="136525"/>
-            <a:ext cx="2925801" cy="6001643"/>
+            <a:off x="6285870" y="136525"/>
+            <a:ext cx="3169457" cy="6001643"/>
           </a:xfrm>
           <a:prstGeom prst="rect">
             <a:avLst/>
@@ -15013,7 +14697,7 @@
                 <a:latin typeface="Courier New" panose="02070309020205020404" pitchFamily="49" charset="0"/>
                 <a:cs typeface="Courier New" panose="02070309020205020404" pitchFamily="49" charset="0"/>
               </a:rPr>
-              <a:t>    return new Result(null, error);</a:t>
+              <a:t>    return new Result(undefined as never, error);</a:t>
             </a:r>
           </a:p>
           <a:p>
@@ -15368,7 +15052,7 @@
                                           </p:stCondLst>
                                         </p:cTn>
                                         <p:tgtEl>
-                                          <p:spTgt spid="2"/>
+                                          <p:spTgt spid="9"/>
                                         </p:tgtEl>
                                         <p:attrNameLst>
                                           <p:attrName>style.visibility</p:attrName>
@@ -15408,51 +15092,6 @@
                                     <p:set>
                                       <p:cBhvr>
                                         <p:cTn id="10" dur="1" fill="hold">
-                                          <p:stCondLst>
-                                            <p:cond delay="0"/>
-                                          </p:stCondLst>
-                                        </p:cTn>
-                                        <p:tgtEl>
-                                          <p:spTgt spid="9"/>
-                                        </p:tgtEl>
-                                        <p:attrNameLst>
-                                          <p:attrName>style.visibility</p:attrName>
-                                        </p:attrNameLst>
-                                      </p:cBhvr>
-                                      <p:to>
-                                        <p:strVal val="visible"/>
-                                      </p:to>
-                                    </p:set>
-                                  </p:childTnLst>
-                                </p:cTn>
-                              </p:par>
-                            </p:childTnLst>
-                          </p:cTn>
-                        </p:par>
-                      </p:childTnLst>
-                    </p:cTn>
-                  </p:par>
-                  <p:par>
-                    <p:cTn id="11" fill="hold">
-                      <p:stCondLst>
-                        <p:cond delay="indefinite"/>
-                      </p:stCondLst>
-                      <p:childTnLst>
-                        <p:par>
-                          <p:cTn id="12" fill="hold">
-                            <p:stCondLst>
-                              <p:cond delay="0"/>
-                            </p:stCondLst>
-                            <p:childTnLst>
-                              <p:par>
-                                <p:cTn id="13" presetID="1" presetClass="entr" presetSubtype="0" fill="hold" grpId="0" nodeType="clickEffect">
-                                  <p:stCondLst>
-                                    <p:cond delay="0"/>
-                                  </p:stCondLst>
-                                  <p:childTnLst>
-                                    <p:set>
-                                      <p:cBhvr>
-                                        <p:cTn id="14" dur="1" fill="hold">
                                           <p:stCondLst>
                                             <p:cond delay="0"/>
                                           </p:stCondLst>
@@ -15499,7 +15138,6 @@
       </p:par>
     </p:tnLst>
     <p:bldLst>
-      <p:bldP spid="2" grpId="0"/>
       <p:bldP spid="9" grpId="0"/>
       <p:bldP spid="10" grpId="0"/>
     </p:bldLst>
@@ -17070,7 +16708,7 @@
         <p:spPr>
           <a:xfrm>
             <a:off x="8730490" y="136525"/>
-            <a:ext cx="2925801" cy="5386090"/>
+            <a:ext cx="3169457" cy="5262979"/>
           </a:xfrm>
           <a:prstGeom prst="rect">
             <a:avLst/>
@@ -17181,16 +16819,7 @@
                 <a:latin typeface="Courier New" panose="02070309020205020404" pitchFamily="49" charset="0"/>
                 <a:cs typeface="Courier New" panose="02070309020205020404" pitchFamily="49" charset="0"/>
               </a:rPr>
-              <a:t>    return new Result(undefined, error)</a:t>
-            </a:r>
-          </a:p>
-          <a:p>
-            <a:r>
-              <a:rPr lang="en-US" sz="800">
-                <a:latin typeface="Courier New" panose="02070309020205020404" pitchFamily="49" charset="0"/>
-                <a:cs typeface="Courier New" panose="02070309020205020404" pitchFamily="49" charset="0"/>
-              </a:rPr>
-              <a:t>      as Result&lt;never, E&gt;;</a:t>
+              <a:t>    return new Result(undefined as never, error);</a:t>
             </a:r>
           </a:p>
           <a:p>

</xml_diff>

<commit_message>
Add Memory Management lecture
</commit_message>
<xml_diff>
--- a/Lesson.07 - Functional Programming/Functional Programming.pptx
+++ b/Lesson.07 - Functional Programming/Functional Programming.pptx
@@ -7906,6 +7906,42 @@
           </a:p>
         </p:txBody>
       </p:sp>
+      <p:cxnSp>
+        <p:nvCxnSpPr>
+          <p:cNvPr id="9" name="Straight Connector 8">
+            <a:extLst>
+              <a:ext uri="{FF2B5EF4-FFF2-40B4-BE49-F238E27FC236}">
+                <a16:creationId xmlns:a16="http://schemas.microsoft.com/office/drawing/2014/main" id="{6B67660B-BA6F-4CFC-CC76-92CD35C72C44}"/>
+              </a:ext>
+            </a:extLst>
+          </p:cNvPr>
+          <p:cNvCxnSpPr/>
+          <p:nvPr/>
+        </p:nvCxnSpPr>
+        <p:spPr>
+          <a:xfrm>
+            <a:off x="895739" y="3750906"/>
+            <a:ext cx="6372808" cy="0"/>
+          </a:xfrm>
+          <a:prstGeom prst="line">
+            <a:avLst/>
+          </a:prstGeom>
+        </p:spPr>
+        <p:style>
+          <a:lnRef idx="2">
+            <a:schemeClr val="accent1"/>
+          </a:lnRef>
+          <a:fillRef idx="0">
+            <a:schemeClr val="accent1"/>
+          </a:fillRef>
+          <a:effectRef idx="1">
+            <a:schemeClr val="accent1"/>
+          </a:effectRef>
+          <a:fontRef idx="minor">
+            <a:schemeClr val="tx1"/>
+          </a:fontRef>
+        </p:style>
+      </p:cxnSp>
     </p:spTree>
     <p:extLst>
       <p:ext uri="{BB962C8B-B14F-4D97-AF65-F5344CB8AC3E}">

</xml_diff>